<commit_message>
ppt of data cleaning
</commit_message>
<xml_diff>
--- a/001.pptx
+++ b/001.pptx
@@ -5,40 +5,44 @@
     <p:sldMasterId id="2147483648" r:id="rId1"/>
   </p:sldMasterIdLst>
   <p:notesMasterIdLst>
-    <p:notesMasterId r:id="rId16"/>
+    <p:notesMasterId r:id="rId17"/>
   </p:notesMasterIdLst>
   <p:handoutMasterIdLst>
-    <p:handoutMasterId r:id="rId17"/>
+    <p:handoutMasterId r:id="rId18"/>
   </p:handoutMasterIdLst>
   <p:sldIdLst>
     <p:sldId id="290" r:id="rId2"/>
     <p:sldId id="298" r:id="rId3"/>
-    <p:sldId id="304" r:id="rId4"/>
-    <p:sldId id="292" r:id="rId5"/>
-    <p:sldId id="293" r:id="rId6"/>
-    <p:sldId id="296" r:id="rId7"/>
-    <p:sldId id="295" r:id="rId8"/>
-    <p:sldId id="294" r:id="rId9"/>
-    <p:sldId id="297" r:id="rId10"/>
-    <p:sldId id="299" r:id="rId11"/>
-    <p:sldId id="301" r:id="rId12"/>
-    <p:sldId id="302" r:id="rId13"/>
-    <p:sldId id="303" r:id="rId14"/>
-    <p:sldId id="305" r:id="rId15"/>
+    <p:sldId id="306" r:id="rId4"/>
+    <p:sldId id="304" r:id="rId5"/>
+    <p:sldId id="292" r:id="rId6"/>
+    <p:sldId id="293" r:id="rId7"/>
+    <p:sldId id="296" r:id="rId8"/>
+    <p:sldId id="295" r:id="rId9"/>
+    <p:sldId id="294" r:id="rId10"/>
+    <p:sldId id="297" r:id="rId11"/>
+    <p:sldId id="299" r:id="rId12"/>
+    <p:sldId id="301" r:id="rId13"/>
+    <p:sldId id="302" r:id="rId14"/>
+    <p:sldId id="303" r:id="rId15"/>
+    <p:sldId id="305" r:id="rId16"/>
   </p:sldIdLst>
   <p:sldSz cx="13011150" cy="7315200"/>
   <p:notesSz cx="7010400" cy="9296400"/>
   <p:embeddedFontLst>
     <p:embeddedFont>
       <p:font typeface="Calibri" panose="020F0502020204030204" pitchFamily="34" charset="0"/>
-      <p:regular r:id="rId18"/>
-      <p:bold r:id="rId19"/>
-      <p:italic r:id="rId20"/>
-      <p:boldItalic r:id="rId21"/>
+      <p:regular r:id="rId19"/>
+      <p:bold r:id="rId20"/>
+      <p:italic r:id="rId21"/>
+      <p:boldItalic r:id="rId22"/>
     </p:embeddedFont>
     <p:embeddedFont>
       <p:font typeface="Roboto" panose="02000000000000000000" pitchFamily="2" charset="0"/>
-      <p:regular r:id="rId22"/>
+      <p:regular r:id="rId23"/>
+      <p:bold r:id="rId24"/>
+      <p:italic r:id="rId25"/>
+      <p:boldItalic r:id="rId26"/>
     </p:embeddedFont>
   </p:embeddedFontLst>
   <p:defaultTextStyle>
@@ -234,7 +238,7 @@
           <a:p>
             <a:fld id="{50968C86-9753-4851-B13B-7DBF8C603A93}" type="datetimeFigureOut">
               <a:rPr lang="en-US" smtClean="0"/>
-              <a:t>7/20/2021</a:t>
+              <a:t>7/26/2021</a:t>
             </a:fld>
             <a:endParaRPr lang="en-US"/>
           </a:p>
@@ -399,7 +403,7 @@
           <a:p>
             <a:fld id="{1D0A429A-90FE-4F33-893D-5F2AADB556A3}" type="datetimeFigureOut">
               <a:rPr lang="en-US"/>
-              <a:t>7/20/2021</a:t>
+              <a:t>7/26/2021</a:t>
             </a:fld>
             <a:endParaRPr lang="en-US"/>
           </a:p>
@@ -825,7 +829,7 @@
           <a:p>
             <a:fld id="{4F38AFD9-D5DB-4A47-A4BE-251B4DF1413A}" type="slidenum">
               <a:rPr lang="en-US" smtClean="0"/>
-              <a:t>3</a:t>
+              <a:t>4</a:t>
             </a:fld>
             <a:endParaRPr lang="en-US"/>
           </a:p>
@@ -909,7 +913,7 @@
           <a:p>
             <a:fld id="{4F38AFD9-D5DB-4A47-A4BE-251B4DF1413A}" type="slidenum">
               <a:rPr lang="en-US" smtClean="0"/>
-              <a:t>4</a:t>
+              <a:t>5</a:t>
             </a:fld>
             <a:endParaRPr lang="en-US"/>
           </a:p>
@@ -1051,7 +1055,7 @@
           <a:p>
             <a:fld id="{4F38AFD9-D5DB-4A47-A4BE-251B4DF1413A}" type="slidenum">
               <a:rPr lang="en-US" smtClean="0"/>
-              <a:t>7</a:t>
+              <a:t>8</a:t>
             </a:fld>
             <a:endParaRPr lang="en-US"/>
           </a:p>
@@ -1135,7 +1139,7 @@
           <a:p>
             <a:fld id="{4F38AFD9-D5DB-4A47-A4BE-251B4DF1413A}" type="slidenum">
               <a:rPr lang="en-US" smtClean="0"/>
-              <a:t>8</a:t>
+              <a:t>9</a:t>
             </a:fld>
             <a:endParaRPr lang="en-US"/>
           </a:p>
@@ -1281,7 +1285,7 @@
           <a:p>
             <a:fld id="{1A2F0B57-8E6A-4005-9EDD-D258F6CC94AB}" type="datetimeFigureOut">
               <a:rPr lang="en-US" smtClean="0"/>
-              <a:t>7/20/2021</a:t>
+              <a:t>7/26/2021</a:t>
             </a:fld>
             <a:endParaRPr/>
           </a:p>
@@ -1504,7 +1508,7 @@
             <a:fld id="{20532436-246E-C341-8F9A-0B4F34C07184}" type="datetimeFigureOut">
               <a:rPr lang="en-US" smtClean="0"/>
               <a:pPr/>
-              <a:t>7/20/2021</a:t>
+              <a:t>7/26/2021</a:t>
             </a:fld>
             <a:endParaRPr lang="en-US"/>
           </a:p>
@@ -1684,7 +1688,7 @@
             <a:fld id="{20532436-246E-C341-8F9A-0B4F34C07184}" type="datetimeFigureOut">
               <a:rPr lang="en-US" smtClean="0"/>
               <a:pPr/>
-              <a:t>7/20/2021</a:t>
+              <a:t>7/26/2021</a:t>
             </a:fld>
             <a:endParaRPr lang="en-US"/>
           </a:p>
@@ -1854,7 +1858,7 @@
             <a:fld id="{20532436-246E-C341-8F9A-0B4F34C07184}" type="datetimeFigureOut">
               <a:rPr lang="en-US" smtClean="0"/>
               <a:pPr/>
-              <a:t>7/20/2021</a:t>
+              <a:t>7/26/2021</a:t>
             </a:fld>
             <a:endParaRPr lang="en-US"/>
           </a:p>
@@ -2101,7 +2105,7 @@
             <a:fld id="{20532436-246E-C341-8F9A-0B4F34C07184}" type="datetimeFigureOut">
               <a:rPr lang="en-US" smtClean="0"/>
               <a:pPr/>
-              <a:t>7/20/2021</a:t>
+              <a:t>7/26/2021</a:t>
             </a:fld>
             <a:endParaRPr lang="en-US"/>
           </a:p>
@@ -2388,7 +2392,7 @@
             <a:fld id="{20532436-246E-C341-8F9A-0B4F34C07184}" type="datetimeFigureOut">
               <a:rPr lang="en-US" smtClean="0"/>
               <a:pPr/>
-              <a:t>7/20/2021</a:t>
+              <a:t>7/26/2021</a:t>
             </a:fld>
             <a:endParaRPr lang="en-US"/>
           </a:p>
@@ -2809,7 +2813,7 @@
             <a:fld id="{20532436-246E-C341-8F9A-0B4F34C07184}" type="datetimeFigureOut">
               <a:rPr lang="en-US" smtClean="0"/>
               <a:pPr/>
-              <a:t>7/20/2021</a:t>
+              <a:t>7/26/2021</a:t>
             </a:fld>
             <a:endParaRPr lang="en-US"/>
           </a:p>
@@ -2928,7 +2932,7 @@
             <a:fld id="{20532436-246E-C341-8F9A-0B4F34C07184}" type="datetimeFigureOut">
               <a:rPr lang="en-US" smtClean="0"/>
               <a:pPr/>
-              <a:t>7/20/2021</a:t>
+              <a:t>7/26/2021</a:t>
             </a:fld>
             <a:endParaRPr lang="en-US"/>
           </a:p>
@@ -3025,7 +3029,7 @@
             <a:fld id="{20532436-246E-C341-8F9A-0B4F34C07184}" type="datetimeFigureOut">
               <a:rPr lang="en-US" smtClean="0"/>
               <a:pPr/>
-              <a:t>7/20/2021</a:t>
+              <a:t>7/26/2021</a:t>
             </a:fld>
             <a:endParaRPr lang="en-US"/>
           </a:p>
@@ -3302,7 +3306,7 @@
             <a:fld id="{20532436-246E-C341-8F9A-0B4F34C07184}" type="datetimeFigureOut">
               <a:rPr lang="en-US" smtClean="0"/>
               <a:pPr/>
-              <a:t>7/20/2021</a:t>
+              <a:t>7/26/2021</a:t>
             </a:fld>
             <a:endParaRPr lang="en-US"/>
           </a:p>
@@ -3556,7 +3560,7 @@
             <a:fld id="{20532436-246E-C341-8F9A-0B4F34C07184}" type="datetimeFigureOut">
               <a:rPr lang="en-US" smtClean="0"/>
               <a:pPr/>
-              <a:t>7/20/2021</a:t>
+              <a:t>7/26/2021</a:t>
             </a:fld>
             <a:endParaRPr lang="en-US"/>
           </a:p>
@@ -3769,7 +3773,7 @@
             <a:fld id="{20532436-246E-C341-8F9A-0B4F34C07184}" type="datetimeFigureOut">
               <a:rPr lang="en-US" smtClean="0"/>
               <a:pPr/>
-              <a:t>7/20/2021</a:t>
+              <a:t>7/26/2021</a:t>
             </a:fld>
             <a:endParaRPr lang="en-US"/>
           </a:p>
@@ -4346,7 +4350,7 @@
           <p:cNvPr id="2" name="标题 1">
             <a:extLst>
               <a:ext uri="{FF2B5EF4-FFF2-40B4-BE49-F238E27FC236}">
-                <a16:creationId xmlns:a16="http://schemas.microsoft.com/office/drawing/2014/main" id="{A2006482-1243-49C1-8007-67E9EF2EEB53}"/>
+                <a16:creationId xmlns:a16="http://schemas.microsoft.com/office/drawing/2014/main" id="{44CBC5AD-E05F-4366-982F-83A4B2546AF3}"/>
               </a:ext>
             </a:extLst>
           </p:cNvPr>
@@ -4359,14 +4363,12 @@
         </p:nvSpPr>
         <p:spPr/>
         <p:txBody>
-          <a:bodyPr>
-            <a:normAutofit fontScale="90000"/>
-          </a:bodyPr>
+          <a:bodyPr/>
           <a:lstStyle/>
           <a:p>
             <a:r>
               <a:rPr lang="en-US" altLang="zh-CN"/>
-              <a:t>recommendation list (10)of high quality experience APPs</a:t>
+              <a:t>price will affect user experience</a:t>
             </a:r>
             <a:endParaRPr lang="zh-CN" altLang="en-US"/>
           </a:p>
@@ -4377,7 +4379,7 @@
           <p:cNvPr id="3" name="内容占位符 2">
             <a:extLst>
               <a:ext uri="{FF2B5EF4-FFF2-40B4-BE49-F238E27FC236}">
-                <a16:creationId xmlns:a16="http://schemas.microsoft.com/office/drawing/2014/main" id="{542671F0-5394-4B68-AEC0-339067203BBC}"/>
+                <a16:creationId xmlns:a16="http://schemas.microsoft.com/office/drawing/2014/main" id="{4CD4F0C0-EE9D-47BD-816A-0A4103DA6ED4}"/>
               </a:ext>
             </a:extLst>
           </p:cNvPr>
@@ -4393,35 +4395,14 @@
           <a:bodyPr/>
           <a:lstStyle/>
           <a:p>
-            <a:r>
-              <a:rPr lang="en-US" altLang="zh-CN"/>
-              <a:t>we sort the APP into three part through installs effect</a:t>
-            </a:r>
-          </a:p>
-          <a:p>
-            <a:r>
-              <a:rPr lang="en-US" altLang="zh-CN"/>
-              <a:t>higher installs apps, more installs:</a:t>
-            </a:r>
-          </a:p>
-          <a:p>
-            <a:r>
-              <a:rPr lang="en-US" altLang="zh-CN"/>
-              <a:t>low installs apps because of diversity:</a:t>
-            </a:r>
-          </a:p>
-          <a:p>
-            <a:r>
-              <a:rPr lang="en-US" altLang="zh-CN"/>
-              <a:t>others: </a:t>
-            </a:r>
+            <a:endParaRPr lang="zh-CN" altLang="en-US"/>
           </a:p>
         </p:txBody>
       </p:sp>
     </p:spTree>
     <p:extLst>
       <p:ext uri="{BB962C8B-B14F-4D97-AF65-F5344CB8AC3E}">
-        <p14:creationId xmlns:p14="http://schemas.microsoft.com/office/powerpoint/2010/main" val="2656625080"/>
+        <p14:creationId xmlns:p14="http://schemas.microsoft.com/office/powerpoint/2010/main" val="1221480575"/>
       </p:ext>
     </p:extLst>
   </p:cSld>
@@ -4453,7 +4434,7 @@
           <p:cNvPr id="2" name="标题 1">
             <a:extLst>
               <a:ext uri="{FF2B5EF4-FFF2-40B4-BE49-F238E27FC236}">
-                <a16:creationId xmlns:a16="http://schemas.microsoft.com/office/drawing/2014/main" id="{B5E15319-43EC-41A7-B65E-0BF1F78C4A49}"/>
+                <a16:creationId xmlns:a16="http://schemas.microsoft.com/office/drawing/2014/main" id="{A2006482-1243-49C1-8007-67E9EF2EEB53}"/>
               </a:ext>
             </a:extLst>
           </p:cNvPr>
@@ -4466,12 +4447,14 @@
         </p:nvSpPr>
         <p:spPr/>
         <p:txBody>
-          <a:bodyPr/>
+          <a:bodyPr>
+            <a:normAutofit fontScale="90000"/>
+          </a:bodyPr>
           <a:lstStyle/>
           <a:p>
             <a:r>
               <a:rPr lang="en-US" altLang="zh-CN"/>
-              <a:t>higher installs apps</a:t>
+              <a:t>recommendation list (10)of high quality experience APPs</a:t>
             </a:r>
             <a:endParaRPr lang="zh-CN" altLang="en-US"/>
           </a:p>
@@ -4482,7 +4465,7 @@
           <p:cNvPr id="3" name="内容占位符 2">
             <a:extLst>
               <a:ext uri="{FF2B5EF4-FFF2-40B4-BE49-F238E27FC236}">
-                <a16:creationId xmlns:a16="http://schemas.microsoft.com/office/drawing/2014/main" id="{25445ECB-1F48-4AFE-94FC-7CC24788B5A6}"/>
+                <a16:creationId xmlns:a16="http://schemas.microsoft.com/office/drawing/2014/main" id="{542671F0-5394-4B68-AEC0-339067203BBC}"/>
               </a:ext>
             </a:extLst>
           </p:cNvPr>
@@ -4498,14 +4481,35 @@
           <a:bodyPr/>
           <a:lstStyle/>
           <a:p>
-            <a:endParaRPr lang="zh-CN" altLang="en-US"/>
+            <a:r>
+              <a:rPr lang="en-US" altLang="zh-CN"/>
+              <a:t>we sort the APP into three part through installs effect</a:t>
+            </a:r>
+          </a:p>
+          <a:p>
+            <a:r>
+              <a:rPr lang="en-US" altLang="zh-CN"/>
+              <a:t>higher installs apps, more installs:</a:t>
+            </a:r>
+          </a:p>
+          <a:p>
+            <a:r>
+              <a:rPr lang="en-US" altLang="zh-CN"/>
+              <a:t>low installs apps because of diversity:</a:t>
+            </a:r>
+          </a:p>
+          <a:p>
+            <a:r>
+              <a:rPr lang="en-US" altLang="zh-CN"/>
+              <a:t>others: </a:t>
+            </a:r>
           </a:p>
         </p:txBody>
       </p:sp>
     </p:spTree>
     <p:extLst>
       <p:ext uri="{BB962C8B-B14F-4D97-AF65-F5344CB8AC3E}">
-        <p14:creationId xmlns:p14="http://schemas.microsoft.com/office/powerpoint/2010/main" val="1922423596"/>
+        <p14:creationId xmlns:p14="http://schemas.microsoft.com/office/powerpoint/2010/main" val="2656625080"/>
       </p:ext>
     </p:extLst>
   </p:cSld>
@@ -4537,7 +4541,7 @@
           <p:cNvPr id="2" name="标题 1">
             <a:extLst>
               <a:ext uri="{FF2B5EF4-FFF2-40B4-BE49-F238E27FC236}">
-                <a16:creationId xmlns:a16="http://schemas.microsoft.com/office/drawing/2014/main" id="{56298815-9C2D-4346-805C-765737AEB8EB}"/>
+                <a16:creationId xmlns:a16="http://schemas.microsoft.com/office/drawing/2014/main" id="{B5E15319-43EC-41A7-B65E-0BF1F78C4A49}"/>
               </a:ext>
             </a:extLst>
           </p:cNvPr>
@@ -4555,7 +4559,7 @@
           <a:p>
             <a:r>
               <a:rPr lang="en-US" altLang="zh-CN"/>
-              <a:t>low installs apps</a:t>
+              <a:t>higher installs apps</a:t>
             </a:r>
             <a:endParaRPr lang="zh-CN" altLang="en-US"/>
           </a:p>
@@ -4566,7 +4570,7 @@
           <p:cNvPr id="3" name="内容占位符 2">
             <a:extLst>
               <a:ext uri="{FF2B5EF4-FFF2-40B4-BE49-F238E27FC236}">
-                <a16:creationId xmlns:a16="http://schemas.microsoft.com/office/drawing/2014/main" id="{BBAE2BCE-D800-4A92-B005-9DF6736B0182}"/>
+                <a16:creationId xmlns:a16="http://schemas.microsoft.com/office/drawing/2014/main" id="{25445ECB-1F48-4AFE-94FC-7CC24788B5A6}"/>
               </a:ext>
             </a:extLst>
           </p:cNvPr>
@@ -4589,7 +4593,7 @@
     </p:spTree>
     <p:extLst>
       <p:ext uri="{BB962C8B-B14F-4D97-AF65-F5344CB8AC3E}">
-        <p14:creationId xmlns:p14="http://schemas.microsoft.com/office/powerpoint/2010/main" val="2761737107"/>
+        <p14:creationId xmlns:p14="http://schemas.microsoft.com/office/powerpoint/2010/main" val="1922423596"/>
       </p:ext>
     </p:extLst>
   </p:cSld>
@@ -4621,6 +4625,90 @@
           <p:cNvPr id="2" name="标题 1">
             <a:extLst>
               <a:ext uri="{FF2B5EF4-FFF2-40B4-BE49-F238E27FC236}">
+                <a16:creationId xmlns:a16="http://schemas.microsoft.com/office/drawing/2014/main" id="{56298815-9C2D-4346-805C-765737AEB8EB}"/>
+              </a:ext>
+            </a:extLst>
+          </p:cNvPr>
+          <p:cNvSpPr>
+            <a:spLocks noGrp="1"/>
+          </p:cNvSpPr>
+          <p:nvPr>
+            <p:ph type="title"/>
+          </p:nvPr>
+        </p:nvSpPr>
+        <p:spPr/>
+        <p:txBody>
+          <a:bodyPr/>
+          <a:lstStyle/>
+          <a:p>
+            <a:r>
+              <a:rPr lang="en-US" altLang="zh-CN"/>
+              <a:t>low installs apps</a:t>
+            </a:r>
+            <a:endParaRPr lang="zh-CN" altLang="en-US"/>
+          </a:p>
+        </p:txBody>
+      </p:sp>
+      <p:sp>
+        <p:nvSpPr>
+          <p:cNvPr id="3" name="内容占位符 2">
+            <a:extLst>
+              <a:ext uri="{FF2B5EF4-FFF2-40B4-BE49-F238E27FC236}">
+                <a16:creationId xmlns:a16="http://schemas.microsoft.com/office/drawing/2014/main" id="{BBAE2BCE-D800-4A92-B005-9DF6736B0182}"/>
+              </a:ext>
+            </a:extLst>
+          </p:cNvPr>
+          <p:cNvSpPr>
+            <a:spLocks noGrp="1"/>
+          </p:cNvSpPr>
+          <p:nvPr>
+            <p:ph idx="1"/>
+          </p:nvPr>
+        </p:nvSpPr>
+        <p:spPr/>
+        <p:txBody>
+          <a:bodyPr/>
+          <a:lstStyle/>
+          <a:p>
+            <a:endParaRPr lang="zh-CN" altLang="en-US"/>
+          </a:p>
+        </p:txBody>
+      </p:sp>
+    </p:spTree>
+    <p:extLst>
+      <p:ext uri="{BB962C8B-B14F-4D97-AF65-F5344CB8AC3E}">
+        <p14:creationId xmlns:p14="http://schemas.microsoft.com/office/powerpoint/2010/main" val="2761737107"/>
+      </p:ext>
+    </p:extLst>
+  </p:cSld>
+  <p:clrMapOvr>
+    <a:masterClrMapping/>
+  </p:clrMapOvr>
+</p:sld>
+</file>
+
+<file path=ppt/slides/slide14.xml><?xml version="1.0" encoding="utf-8"?>
+<p:sld xmlns:a="http://schemas.openxmlformats.org/drawingml/2006/main" xmlns:r="http://schemas.openxmlformats.org/officeDocument/2006/relationships" xmlns:p="http://schemas.openxmlformats.org/presentationml/2006/main">
+  <p:cSld>
+    <p:spTree>
+      <p:nvGrpSpPr>
+        <p:cNvPr id="1" name=""/>
+        <p:cNvGrpSpPr/>
+        <p:nvPr/>
+      </p:nvGrpSpPr>
+      <p:grpSpPr>
+        <a:xfrm>
+          <a:off x="0" y="0"/>
+          <a:ext cx="0" cy="0"/>
+          <a:chOff x="0" y="0"/>
+          <a:chExt cx="0" cy="0"/>
+        </a:xfrm>
+      </p:grpSpPr>
+      <p:sp>
+        <p:nvSpPr>
+          <p:cNvPr id="2" name="标题 1">
+            <a:extLst>
+              <a:ext uri="{FF2B5EF4-FFF2-40B4-BE49-F238E27FC236}">
                 <a16:creationId xmlns:a16="http://schemas.microsoft.com/office/drawing/2014/main" id="{E57F9CBE-863C-4B3D-804D-14663B3497CB}"/>
               </a:ext>
             </a:extLst>
@@ -4683,7 +4771,7 @@
 </p:sld>
 </file>
 
-<file path=ppt/slides/slide14.xml><?xml version="1.0" encoding="utf-8"?>
+<file path=ppt/slides/slide15.xml><?xml version="1.0" encoding="utf-8"?>
 <p:sld xmlns:a="http://schemas.openxmlformats.org/drawingml/2006/main" xmlns:r="http://schemas.openxmlformats.org/officeDocument/2006/relationships" xmlns:p="http://schemas.openxmlformats.org/presentationml/2006/main">
   <p:cSld>
     <p:spTree>
@@ -5011,7 +5099,7 @@
           <p:cNvPr id="2" name="标题 1">
             <a:extLst>
               <a:ext uri="{FF2B5EF4-FFF2-40B4-BE49-F238E27FC236}">
-                <a16:creationId xmlns:a16="http://schemas.microsoft.com/office/drawing/2014/main" id="{004BCF9C-1B9C-49D7-A7D4-46215C3E256B}"/>
+                <a16:creationId xmlns:a16="http://schemas.microsoft.com/office/drawing/2014/main" id="{96427C67-1455-4295-805E-029F19E006A5}"/>
               </a:ext>
             </a:extLst>
           </p:cNvPr>
@@ -5022,16 +5110,21 @@
             <p:ph type="title"/>
           </p:nvPr>
         </p:nvSpPr>
-        <p:spPr/>
-        <p:txBody>
-          <a:bodyPr/>
-          <a:lstStyle/>
-          <a:p>
-            <a:r>
-              <a:rPr lang="en-US" altLang="zh-CN"/>
-              <a:t>how did we do the word segmentation</a:t>
-            </a:r>
-            <a:endParaRPr lang="zh-CN" altLang="en-US"/>
+        <p:spPr>
+          <a:xfrm>
+            <a:off x="6800650" y="3504137"/>
+            <a:ext cx="4271058" cy="1143000"/>
+          </a:xfrm>
+        </p:spPr>
+        <p:txBody>
+          <a:bodyPr/>
+          <a:lstStyle/>
+          <a:p>
+            <a:r>
+              <a:rPr lang="en-US" altLang="zh-CN" dirty="0"/>
+              <a:t>Data Cleaning</a:t>
+            </a:r>
+            <a:endParaRPr lang="zh-CN" altLang="en-US" dirty="0"/>
           </a:p>
         </p:txBody>
       </p:sp>
@@ -5040,7 +5133,7 @@
           <p:cNvPr id="3" name="内容占位符 2">
             <a:extLst>
               <a:ext uri="{FF2B5EF4-FFF2-40B4-BE49-F238E27FC236}">
-                <a16:creationId xmlns:a16="http://schemas.microsoft.com/office/drawing/2014/main" id="{0921A45F-6A13-41F5-AB26-F8157D40799A}"/>
+                <a16:creationId xmlns:a16="http://schemas.microsoft.com/office/drawing/2014/main" id="{4439B693-0BCF-49F6-BCAA-669D2BAA3C25}"/>
               </a:ext>
             </a:extLst>
           </p:cNvPr>
@@ -5051,54 +5144,485 @@
             <p:ph idx="1"/>
           </p:nvPr>
         </p:nvSpPr>
-        <p:spPr/>
-        <p:txBody>
-          <a:bodyPr/>
-          <a:lstStyle/>
-          <a:p>
-            <a:r>
-              <a:rPr lang="en-US" altLang="zh-CN"/>
-              <a:t>python numpy and pandas: combine the words into the alphabetic string</a:t>
-            </a:r>
-          </a:p>
-          <a:p>
-            <a:r>
-              <a:rPr lang="en-US" altLang="zh-CN"/>
-              <a:t>pick up the adj. and noun through the alphabetic string in keywords list</a:t>
-            </a:r>
-          </a:p>
-          <a:p>
-            <a:r>
-              <a:rPr lang="en-US" altLang="zh-CN"/>
-              <a:t>use excel statistics the frequency of occurrence of keywords</a:t>
-            </a:r>
-          </a:p>
-          <a:p>
-            <a:pPr lvl="1"/>
-            <a:r>
-              <a:rPr lang="en-US" altLang="zh-CN"/>
-              <a:t>for example, in app FBReade, useful has occurred for 8 times</a:t>
+        <p:spPr>
+          <a:xfrm>
+            <a:off x="305972" y="1385320"/>
+            <a:ext cx="5497657" cy="5756260"/>
+          </a:xfrm>
+        </p:spPr>
+        <p:txBody>
+          <a:bodyPr>
+            <a:normAutofit fontScale="62500" lnSpcReduction="20000"/>
+          </a:bodyPr>
+          <a:lstStyle/>
+          <a:p>
+            <a:r>
+              <a:rPr lang="en-US" altLang="zh-CN" dirty="0"/>
+              <a:t>googleplaystore.csv:</a:t>
+            </a:r>
+          </a:p>
+          <a:p>
+            <a:pPr lvl="1">
+              <a:lnSpc>
+                <a:spcPct val="145000"/>
+              </a:lnSpc>
+            </a:pPr>
+            <a:r>
+              <a:rPr lang="en-US" altLang="zh-CN" sz="2600" b="0" i="0" dirty="0">
+                <a:solidFill>
+                  <a:srgbClr val="000000"/>
+                </a:solidFill>
+                <a:effectLst/>
+                <a:latin typeface="Roboto" panose="02000000000000000000" pitchFamily="2" charset="0"/>
+              </a:rPr>
+              <a:t>Modify </a:t>
+            </a:r>
+            <a:r>
+              <a:rPr lang="en-US" altLang="zh-CN" sz="2600" dirty="0">
+                <a:solidFill>
+                  <a:srgbClr val="000000"/>
+                </a:solidFill>
+                <a:latin typeface="Roboto" panose="02000000000000000000" pitchFamily="2" charset="0"/>
+              </a:rPr>
+              <a:t>dislocation</a:t>
+            </a:r>
+          </a:p>
+          <a:p>
+            <a:pPr lvl="1">
+              <a:lnSpc>
+                <a:spcPct val="145000"/>
+              </a:lnSpc>
+            </a:pPr>
+            <a:r>
+              <a:rPr lang="en-US" altLang="zh-CN" sz="2600" dirty="0">
+                <a:solidFill>
+                  <a:srgbClr val="000000"/>
+                </a:solidFill>
+                <a:latin typeface="Roboto" panose="02000000000000000000" pitchFamily="2" charset="0"/>
+              </a:rPr>
+              <a:t>Rating : </a:t>
+            </a:r>
+            <a:r>
+              <a:rPr lang="en-US" altLang="zh-CN" sz="2600" dirty="0" err="1">
+                <a:solidFill>
+                  <a:srgbClr val="000000"/>
+                </a:solidFill>
+                <a:latin typeface="Roboto" panose="02000000000000000000" pitchFamily="2" charset="0"/>
+              </a:rPr>
+              <a:t>NaN</a:t>
+            </a:r>
+            <a:r>
+              <a:rPr lang="en-US" altLang="zh-CN" sz="2600" dirty="0">
+                <a:solidFill>
+                  <a:srgbClr val="000000"/>
+                </a:solidFill>
+                <a:latin typeface="Roboto" panose="02000000000000000000" pitchFamily="2" charset="0"/>
+              </a:rPr>
+              <a:t>-&gt;0</a:t>
+            </a:r>
+          </a:p>
+          <a:p>
+            <a:pPr lvl="1">
+              <a:lnSpc>
+                <a:spcPct val="145000"/>
+              </a:lnSpc>
+            </a:pPr>
+            <a:r>
+              <a:rPr lang="en-US" altLang="zh-CN" sz="2600" dirty="0">
+                <a:solidFill>
+                  <a:srgbClr val="000000"/>
+                </a:solidFill>
+                <a:latin typeface="Roboto" panose="02000000000000000000" pitchFamily="2" charset="0"/>
+              </a:rPr>
+              <a:t>app list : delete the repetition</a:t>
+            </a:r>
+          </a:p>
+          <a:p>
+            <a:pPr lvl="1">
+              <a:lnSpc>
+                <a:spcPct val="145000"/>
+              </a:lnSpc>
+            </a:pPr>
+            <a:r>
+              <a:rPr lang="en-US" altLang="zh-CN" sz="2600" dirty="0">
+                <a:solidFill>
+                  <a:srgbClr val="000000"/>
+                </a:solidFill>
+                <a:latin typeface="Roboto" panose="02000000000000000000" pitchFamily="2" charset="0"/>
+              </a:rPr>
+              <a:t>size list : Convert Mb to </a:t>
+            </a:r>
+            <a:r>
+              <a:rPr lang="en-US" altLang="zh-CN" sz="2600" dirty="0" err="1">
+                <a:solidFill>
+                  <a:srgbClr val="000000"/>
+                </a:solidFill>
+                <a:latin typeface="Roboto" panose="02000000000000000000" pitchFamily="2" charset="0"/>
+              </a:rPr>
+              <a:t>Kb</a:t>
+            </a:r>
+            <a:r>
+              <a:rPr lang="en-US" altLang="zh-CN" sz="2600" dirty="0">
+                <a:solidFill>
+                  <a:srgbClr val="000000"/>
+                </a:solidFill>
+                <a:latin typeface="Roboto" panose="02000000000000000000" pitchFamily="2" charset="0"/>
+              </a:rPr>
+              <a:t> and delete the unit</a:t>
+            </a:r>
+          </a:p>
+          <a:p>
+            <a:pPr lvl="1">
+              <a:lnSpc>
+                <a:spcPct val="145000"/>
+              </a:lnSpc>
+            </a:pPr>
+            <a:r>
+              <a:rPr lang="en-US" altLang="zh-CN" sz="2600" dirty="0">
+                <a:solidFill>
+                  <a:srgbClr val="000000"/>
+                </a:solidFill>
+                <a:latin typeface="Roboto" panose="02000000000000000000" pitchFamily="2" charset="0"/>
+              </a:rPr>
+              <a:t>installs list : delete the ‘+’ </a:t>
+            </a:r>
+          </a:p>
+          <a:p>
+            <a:pPr lvl="1">
+              <a:lnSpc>
+                <a:spcPct val="145000"/>
+              </a:lnSpc>
+            </a:pPr>
+            <a:r>
+              <a:rPr lang="en-US" altLang="zh-CN" sz="2600" dirty="0">
+                <a:solidFill>
+                  <a:srgbClr val="000000"/>
+                </a:solidFill>
+                <a:latin typeface="Roboto" panose="02000000000000000000" pitchFamily="2" charset="0"/>
+              </a:rPr>
+              <a:t>Last Update : Unified formula</a:t>
+            </a:r>
+          </a:p>
+          <a:p>
+            <a:pPr lvl="1">
+              <a:lnSpc>
+                <a:spcPct val="145000"/>
+              </a:lnSpc>
+            </a:pPr>
+            <a:r>
+              <a:rPr lang="en-US" altLang="zh-CN" sz="2600" dirty="0">
+                <a:solidFill>
+                  <a:srgbClr val="000000"/>
+                </a:solidFill>
+                <a:latin typeface="Roboto" panose="02000000000000000000" pitchFamily="2" charset="0"/>
+              </a:rPr>
+              <a:t>category list : replace the null with Other</a:t>
+            </a:r>
+          </a:p>
+          <a:p>
+            <a:pPr lvl="1">
+              <a:lnSpc>
+                <a:spcPct val="145000"/>
+              </a:lnSpc>
+            </a:pPr>
+            <a:r>
+              <a:rPr lang="en-US" altLang="zh-CN" sz="2600" dirty="0">
+                <a:solidFill>
+                  <a:srgbClr val="000000"/>
+                </a:solidFill>
+                <a:latin typeface="Roboto" panose="02000000000000000000" pitchFamily="2" charset="0"/>
+              </a:rPr>
+              <a:t>Price : delete the $</a:t>
             </a:r>
           </a:p>
           <a:p>
             <a:pPr marL="457200" lvl="1" indent="0">
+              <a:lnSpc>
+                <a:spcPct val="145000"/>
+              </a:lnSpc>
               <a:buNone/>
             </a:pPr>
-            <a:endParaRPr lang="en-US" altLang="zh-CN"/>
-          </a:p>
-          <a:p>
-            <a:r>
-              <a:rPr lang="en-US" altLang="zh-CN"/>
-              <a:t>create word cloud through the frequency of occurence</a:t>
-            </a:r>
+            <a:endParaRPr lang="en-US" altLang="zh-CN" sz="2600" dirty="0"/>
+          </a:p>
+          <a:p>
+            <a:r>
+              <a:rPr lang="en-US" altLang="zh-CN" dirty="0"/>
+              <a:t>googleplay_user_reviews.csv</a:t>
+            </a:r>
+          </a:p>
+          <a:p>
+            <a:pPr lvl="1">
+              <a:lnSpc>
+                <a:spcPct val="145000"/>
+              </a:lnSpc>
+            </a:pPr>
+            <a:r>
+              <a:rPr lang="en-US" altLang="zh-CN" sz="2600" dirty="0">
+                <a:solidFill>
+                  <a:srgbClr val="000000"/>
+                </a:solidFill>
+                <a:latin typeface="Roboto" panose="02000000000000000000" pitchFamily="2" charset="0"/>
+              </a:rPr>
+              <a:t>Modify dislocation</a:t>
+            </a:r>
+          </a:p>
+          <a:p>
+            <a:pPr lvl="1">
+              <a:lnSpc>
+                <a:spcPct val="145000"/>
+              </a:lnSpc>
+            </a:pPr>
+            <a:r>
+              <a:rPr lang="en-US" altLang="zh-CN" sz="2600" dirty="0">
+                <a:solidFill>
+                  <a:srgbClr val="000000"/>
+                </a:solidFill>
+                <a:latin typeface="Roboto" panose="02000000000000000000" pitchFamily="2" charset="0"/>
+              </a:rPr>
+              <a:t>delete the null value reviews</a:t>
+            </a:r>
+          </a:p>
+          <a:p>
+            <a:pPr lvl="1">
+              <a:lnSpc>
+                <a:spcPct val="145000"/>
+              </a:lnSpc>
+            </a:pPr>
+            <a:r>
+              <a:rPr lang="en-US" altLang="zh-CN" sz="2600" dirty="0">
+                <a:solidFill>
+                  <a:srgbClr val="000000"/>
+                </a:solidFill>
+                <a:latin typeface="Roboto" panose="02000000000000000000" pitchFamily="2" charset="0"/>
+              </a:rPr>
+              <a:t>delete the redundancy review record</a:t>
+            </a:r>
+            <a:endParaRPr lang="en-US" altLang="zh-CN" sz="3200" dirty="0"/>
+          </a:p>
+          <a:p>
+            <a:endParaRPr lang="zh-CN" altLang="en-US" dirty="0"/>
+          </a:p>
+        </p:txBody>
+      </p:sp>
+      <p:pic>
+        <p:nvPicPr>
+          <p:cNvPr id="5" name="图片 4">
+            <a:extLst>
+              <a:ext uri="{FF2B5EF4-FFF2-40B4-BE49-F238E27FC236}">
+                <a16:creationId xmlns:a16="http://schemas.microsoft.com/office/drawing/2014/main" id="{62F470C3-8A50-4146-B645-533888FA276D}"/>
+              </a:ext>
+            </a:extLst>
+          </p:cNvPr>
+          <p:cNvPicPr>
+            <a:picLocks noChangeAspect="1"/>
+          </p:cNvPicPr>
+          <p:nvPr/>
+        </p:nvPicPr>
+        <p:blipFill>
+          <a:blip r:embed="rId2"/>
+          <a:stretch>
+            <a:fillRect/>
+          </a:stretch>
+        </p:blipFill>
+        <p:spPr>
+          <a:xfrm>
+            <a:off x="6098346" y="630875"/>
+            <a:ext cx="3391194" cy="754445"/>
+          </a:xfrm>
+          <a:prstGeom prst="rect">
+            <a:avLst/>
+          </a:prstGeom>
+        </p:spPr>
+      </p:pic>
+      <p:pic>
+        <p:nvPicPr>
+          <p:cNvPr id="11" name="图片 10">
+            <a:extLst>
+              <a:ext uri="{FF2B5EF4-FFF2-40B4-BE49-F238E27FC236}">
+                <a16:creationId xmlns:a16="http://schemas.microsoft.com/office/drawing/2014/main" id="{18723201-9932-494C-8D77-EAEF15F1A84F}"/>
+              </a:ext>
+            </a:extLst>
+          </p:cNvPr>
+          <p:cNvPicPr>
+            <a:picLocks noChangeAspect="1"/>
+          </p:cNvPicPr>
+          <p:nvPr/>
+        </p:nvPicPr>
+        <p:blipFill>
+          <a:blip r:embed="rId3"/>
+          <a:stretch>
+            <a:fillRect/>
+          </a:stretch>
+        </p:blipFill>
+        <p:spPr>
+          <a:xfrm>
+            <a:off x="6070353" y="1637175"/>
+            <a:ext cx="6721422" cy="1615580"/>
+          </a:xfrm>
+          <a:prstGeom prst="rect">
+            <a:avLst/>
+          </a:prstGeom>
+        </p:spPr>
+      </p:pic>
+      <p:pic>
+        <p:nvPicPr>
+          <p:cNvPr id="13" name="图片 12">
+            <a:extLst>
+              <a:ext uri="{FF2B5EF4-FFF2-40B4-BE49-F238E27FC236}">
+                <a16:creationId xmlns:a16="http://schemas.microsoft.com/office/drawing/2014/main" id="{C7D483F0-4863-44AE-A843-92CBD8C0563D}"/>
+              </a:ext>
+            </a:extLst>
+          </p:cNvPr>
+          <p:cNvPicPr>
+            <a:picLocks noChangeAspect="1"/>
+          </p:cNvPicPr>
+          <p:nvPr/>
+        </p:nvPicPr>
+        <p:blipFill>
+          <a:blip r:embed="rId4"/>
+          <a:stretch>
+            <a:fillRect/>
+          </a:stretch>
+        </p:blipFill>
+        <p:spPr>
+          <a:xfrm>
+            <a:off x="5803629" y="4870235"/>
+            <a:ext cx="6988146" cy="1615580"/>
+          </a:xfrm>
+          <a:prstGeom prst="rect">
+            <a:avLst/>
+          </a:prstGeom>
+        </p:spPr>
+      </p:pic>
+      <p:sp>
+        <p:nvSpPr>
+          <p:cNvPr id="14" name="箭头: 虚尾 13">
+            <a:extLst>
+              <a:ext uri="{FF2B5EF4-FFF2-40B4-BE49-F238E27FC236}">
+                <a16:creationId xmlns:a16="http://schemas.microsoft.com/office/drawing/2014/main" id="{3F5897E7-53B1-4F31-A307-F0EC663B04D5}"/>
+              </a:ext>
+            </a:extLst>
+          </p:cNvPr>
+          <p:cNvSpPr/>
+          <p:nvPr/>
+        </p:nvSpPr>
+        <p:spPr>
+          <a:xfrm rot="5400000">
+            <a:off x="10498926" y="3675316"/>
+            <a:ext cx="1145563" cy="854912"/>
+          </a:xfrm>
+          <a:prstGeom prst="stripedRightArrow">
+            <a:avLst/>
+          </a:prstGeom>
+        </p:spPr>
+        <p:style>
+          <a:lnRef idx="1">
+            <a:schemeClr val="accent1"/>
+          </a:lnRef>
+          <a:fillRef idx="3">
+            <a:schemeClr val="accent1"/>
+          </a:fillRef>
+          <a:effectRef idx="2">
+            <a:schemeClr val="accent1"/>
+          </a:effectRef>
+          <a:fontRef idx="minor">
+            <a:schemeClr val="lt1"/>
+          </a:fontRef>
+        </p:style>
+        <p:txBody>
+          <a:bodyPr rtlCol="0" anchor="ctr"/>
+          <a:lstStyle/>
+          <a:p>
+            <a:pPr algn="ctr"/>
             <a:endParaRPr lang="zh-CN" altLang="en-US"/>
           </a:p>
         </p:txBody>
       </p:sp>
+      <p:sp>
+        <p:nvSpPr>
+          <p:cNvPr id="17" name="文本框 16">
+            <a:extLst>
+              <a:ext uri="{FF2B5EF4-FFF2-40B4-BE49-F238E27FC236}">
+                <a16:creationId xmlns:a16="http://schemas.microsoft.com/office/drawing/2014/main" id="{53FF6601-715A-4441-B312-A30AFC65BEC7}"/>
+              </a:ext>
+            </a:extLst>
+          </p:cNvPr>
+          <p:cNvSpPr txBox="1"/>
+          <p:nvPr/>
+        </p:nvSpPr>
+        <p:spPr>
+          <a:xfrm>
+            <a:off x="9931983" y="630875"/>
+            <a:ext cx="1797415" cy="523220"/>
+          </a:xfrm>
+          <a:prstGeom prst="rect">
+            <a:avLst/>
+          </a:prstGeom>
+          <a:noFill/>
+        </p:spPr>
+        <p:txBody>
+          <a:bodyPr wrap="none" rtlCol="0">
+            <a:spAutoFit/>
+          </a:bodyPr>
+          <a:lstStyle/>
+          <a:p>
+            <a:r>
+              <a:rPr lang="en-US" altLang="zh-CN" sz="2800" dirty="0"/>
+              <a:t>Dislocation</a:t>
+            </a:r>
+            <a:endParaRPr lang="zh-CN" altLang="en-US" sz="2800" dirty="0"/>
+          </a:p>
+        </p:txBody>
+      </p:sp>
+      <p:cxnSp>
+        <p:nvCxnSpPr>
+          <p:cNvPr id="19" name="直接箭头连接符 18">
+            <a:extLst>
+              <a:ext uri="{FF2B5EF4-FFF2-40B4-BE49-F238E27FC236}">
+                <a16:creationId xmlns:a16="http://schemas.microsoft.com/office/drawing/2014/main" id="{1A1F9601-B811-46AF-A25C-CDBDA91AAB33}"/>
+              </a:ext>
+            </a:extLst>
+          </p:cNvPr>
+          <p:cNvCxnSpPr>
+            <a:stCxn id="17" idx="1"/>
+            <a:endCxn id="5" idx="3"/>
+          </p:cNvCxnSpPr>
+          <p:nvPr/>
+        </p:nvCxnSpPr>
+        <p:spPr>
+          <a:xfrm flipH="1">
+            <a:off x="9489540" y="892485"/>
+            <a:ext cx="442443" cy="115613"/>
+          </a:xfrm>
+          <a:prstGeom prst="straightConnector1">
+            <a:avLst/>
+          </a:prstGeom>
+          <a:ln>
+            <a:solidFill>
+              <a:srgbClr val="FF0000"/>
+            </a:solidFill>
+            <a:tailEnd type="triangle"/>
+          </a:ln>
+        </p:spPr>
+        <p:style>
+          <a:lnRef idx="2">
+            <a:schemeClr val="accent1"/>
+          </a:lnRef>
+          <a:fillRef idx="0">
+            <a:schemeClr val="accent1"/>
+          </a:fillRef>
+          <a:effectRef idx="1">
+            <a:schemeClr val="accent1"/>
+          </a:effectRef>
+          <a:fontRef idx="minor">
+            <a:schemeClr val="tx1"/>
+          </a:fontRef>
+        </p:style>
+      </p:cxnSp>
     </p:spTree>
     <p:extLst>
       <p:ext uri="{BB962C8B-B14F-4D97-AF65-F5344CB8AC3E}">
-        <p14:creationId xmlns:p14="http://schemas.microsoft.com/office/powerpoint/2010/main" val="507880145"/>
+        <p14:creationId xmlns:p14="http://schemas.microsoft.com/office/powerpoint/2010/main" val="18542939"/>
       </p:ext>
     </p:extLst>
   </p:cSld>
@@ -5127,7 +5651,13 @@
       </p:grpSpPr>
       <p:sp>
         <p:nvSpPr>
-          <p:cNvPr id="2" name="Title 1"/>
+          <p:cNvPr id="2" name="标题 1">
+            <a:extLst>
+              <a:ext uri="{FF2B5EF4-FFF2-40B4-BE49-F238E27FC236}">
+                <a16:creationId xmlns:a16="http://schemas.microsoft.com/office/drawing/2014/main" id="{004BCF9C-1B9C-49D7-A7D4-46215C3E256B}"/>
+              </a:ext>
+            </a:extLst>
+          </p:cNvPr>
           <p:cNvSpPr>
             <a:spLocks noGrp="1"/>
           </p:cNvSpPr>
@@ -5142,15 +5672,21 @@
           <a:p>
             <a:r>
               <a:rPr lang="en-US" altLang="zh-CN"/>
-              <a:t>data analysis </a:t>
-            </a:r>
-            <a:endParaRPr lang="en-US"/>
-          </a:p>
-        </p:txBody>
-      </p:sp>
-      <p:sp>
-        <p:nvSpPr>
-          <p:cNvPr id="3" name="Content Placeholder 2"/>
+              <a:t>how did we do the word segmentation</a:t>
+            </a:r>
+            <a:endParaRPr lang="zh-CN" altLang="en-US"/>
+          </a:p>
+        </p:txBody>
+      </p:sp>
+      <p:sp>
+        <p:nvSpPr>
+          <p:cNvPr id="3" name="内容占位符 2">
+            <a:extLst>
+              <a:ext uri="{FF2B5EF4-FFF2-40B4-BE49-F238E27FC236}">
+                <a16:creationId xmlns:a16="http://schemas.microsoft.com/office/drawing/2014/main" id="{0921A45F-6A13-41F5-AB26-F8157D40799A}"/>
+              </a:ext>
+            </a:extLst>
+          </p:cNvPr>
           <p:cNvSpPr>
             <a:spLocks noGrp="1"/>
           </p:cNvSpPr>
@@ -5160,117 +5696,52 @@
         </p:nvSpPr>
         <p:spPr/>
         <p:txBody>
-          <a:bodyPr>
-            <a:normAutofit fontScale="92500" lnSpcReduction="20000"/>
-          </a:bodyPr>
-          <a:lstStyle/>
-          <a:p>
-            <a:pPr marL="0" indent="0" algn="l">
+          <a:bodyPr/>
+          <a:lstStyle/>
+          <a:p>
+            <a:r>
+              <a:rPr lang="en-US" altLang="zh-CN"/>
+              <a:t>python numpy and pandas: combine the words into the alphabetic string</a:t>
+            </a:r>
+          </a:p>
+          <a:p>
+            <a:r>
+              <a:rPr lang="en-US" altLang="zh-CN"/>
+              <a:t>pick up the adj. and noun through the alphabetic string in keywords list</a:t>
+            </a:r>
+          </a:p>
+          <a:p>
+            <a:r>
+              <a:rPr lang="en-US" altLang="zh-CN"/>
+              <a:t>use excel statistics the frequency of occurrence of keywords</a:t>
+            </a:r>
+          </a:p>
+          <a:p>
+            <a:pPr lvl="1"/>
+            <a:r>
+              <a:rPr lang="en-US" altLang="zh-CN"/>
+              <a:t>for example, in app FBReade, useful has occurred for 8 times</a:t>
+            </a:r>
+          </a:p>
+          <a:p>
+            <a:pPr marL="457200" lvl="1" indent="0">
               <a:buNone/>
             </a:pPr>
-            <a:r>
-              <a:rPr lang="en-US" altLang="zh-CN" b="0" i="0">
-                <a:solidFill>
-                  <a:srgbClr val="24292E"/>
-                </a:solidFill>
-                <a:effectLst/>
-                <a:latin typeface="-apple-system"/>
-              </a:rPr>
-              <a:t>We want to create Rank formula through four steps:</a:t>
-            </a:r>
-          </a:p>
-          <a:p>
-            <a:pPr marL="514350" indent="-514350" algn="l">
-              <a:buFont typeface="+mj-lt"/>
-              <a:buAutoNum type="arabicPeriod"/>
-            </a:pPr>
-            <a:r>
-              <a:rPr lang="en-US" altLang="zh-CN" b="0" i="0">
-                <a:solidFill>
-                  <a:srgbClr val="24292E"/>
-                </a:solidFill>
-                <a:effectLst/>
-                <a:latin typeface="-apple-system"/>
-              </a:rPr>
-              <a:t>rating of the apps is of the most significant</a:t>
-            </a:r>
-            <a:r>
-              <a:rPr lang="en-US" altLang="zh-CN">
-                <a:solidFill>
-                  <a:srgbClr val="24292E"/>
-                </a:solidFill>
-                <a:latin typeface="-apple-system"/>
-              </a:rPr>
-              <a:t>, </a:t>
-            </a:r>
-            <a:r>
-              <a:rPr lang="en-US" altLang="zh-CN" b="0" i="0">
-                <a:solidFill>
-                  <a:srgbClr val="24292E"/>
-                </a:solidFill>
-                <a:effectLst/>
-                <a:latin typeface="-apple-system"/>
-              </a:rPr>
-              <a:t>and the downloads and the number of comments are also important to rank the apps, </a:t>
-            </a:r>
-          </a:p>
-          <a:p>
-            <a:pPr marL="514350" indent="-514350" algn="l">
-              <a:buFont typeface="+mj-lt"/>
-              <a:buAutoNum type="arabicPeriod"/>
-            </a:pPr>
-            <a:r>
-              <a:rPr lang="en-US" altLang="zh-CN" b="0" i="0">
-                <a:solidFill>
-                  <a:srgbClr val="24292E"/>
-                </a:solidFill>
-                <a:effectLst/>
-                <a:latin typeface="-apple-system"/>
-              </a:rPr>
-              <a:t>We use the rating and the number of installs to measure the measure the quality of Apps. </a:t>
-            </a:r>
-          </a:p>
-          <a:p>
-            <a:pPr marL="514350" indent="-514350" algn="l">
-              <a:buFont typeface="+mj-lt"/>
-              <a:buAutoNum type="arabicPeriod"/>
-            </a:pPr>
-            <a:r>
-              <a:rPr lang="en-US" altLang="zh-CN" b="0" i="0">
-                <a:solidFill>
-                  <a:srgbClr val="24292E"/>
-                </a:solidFill>
-                <a:effectLst/>
-                <a:latin typeface="-apple-system"/>
-              </a:rPr>
-              <a:t>there are also some dimensions of the apps in the dataset we need to analysis whether we should add them to the Rank formula</a:t>
-            </a:r>
-          </a:p>
-          <a:p>
-            <a:pPr marL="514350" indent="-514350" algn="l">
-              <a:buFont typeface="+mj-lt"/>
-              <a:buAutoNum type="arabicPeriod"/>
-            </a:pPr>
-            <a:r>
-              <a:rPr lang="en-US" altLang="zh-CN" b="0" i="0">
-                <a:solidFill>
-                  <a:srgbClr val="24292E"/>
-                </a:solidFill>
-                <a:effectLst/>
-                <a:latin typeface="-apple-system"/>
-              </a:rPr>
-              <a:t>such as the Size of the Apps, the Price of the Apps. In order to design the formula to rank Apps we post 4 sub questions.</a:t>
-            </a:r>
-          </a:p>
-          <a:p>
-            <a:endParaRPr lang="en-US"/>
+            <a:endParaRPr lang="en-US" altLang="zh-CN"/>
+          </a:p>
+          <a:p>
+            <a:r>
+              <a:rPr lang="en-US" altLang="zh-CN"/>
+              <a:t>create word cloud through the frequency of occurence</a:t>
+            </a:r>
+            <a:endParaRPr lang="zh-CN" altLang="en-US"/>
           </a:p>
         </p:txBody>
       </p:sp>
     </p:spTree>
     <p:extLst>
       <p:ext uri="{BB962C8B-B14F-4D97-AF65-F5344CB8AC3E}">
-        <p14:creationId xmlns:p14="http://schemas.microsoft.com/office/powerpoint/2010/main" val="970001553"/>
+        <p14:creationId xmlns:p14="http://schemas.microsoft.com/office/powerpoint/2010/main" val="507880145"/>
       </p:ext>
     </p:extLst>
   </p:cSld>
@@ -5299,6 +5770,178 @@
       </p:grpSpPr>
       <p:sp>
         <p:nvSpPr>
+          <p:cNvPr id="2" name="Title 1"/>
+          <p:cNvSpPr>
+            <a:spLocks noGrp="1"/>
+          </p:cNvSpPr>
+          <p:nvPr>
+            <p:ph type="title"/>
+          </p:nvPr>
+        </p:nvSpPr>
+        <p:spPr/>
+        <p:txBody>
+          <a:bodyPr/>
+          <a:lstStyle/>
+          <a:p>
+            <a:r>
+              <a:rPr lang="en-US" altLang="zh-CN"/>
+              <a:t>data analysis </a:t>
+            </a:r>
+            <a:endParaRPr lang="en-US"/>
+          </a:p>
+        </p:txBody>
+      </p:sp>
+      <p:sp>
+        <p:nvSpPr>
+          <p:cNvPr id="3" name="Content Placeholder 2"/>
+          <p:cNvSpPr>
+            <a:spLocks noGrp="1"/>
+          </p:cNvSpPr>
+          <p:nvPr>
+            <p:ph idx="1"/>
+          </p:nvPr>
+        </p:nvSpPr>
+        <p:spPr/>
+        <p:txBody>
+          <a:bodyPr>
+            <a:normAutofit fontScale="92500" lnSpcReduction="20000"/>
+          </a:bodyPr>
+          <a:lstStyle/>
+          <a:p>
+            <a:pPr marL="0" indent="0" algn="l">
+              <a:buNone/>
+            </a:pPr>
+            <a:r>
+              <a:rPr lang="en-US" altLang="zh-CN" b="0" i="0">
+                <a:solidFill>
+                  <a:srgbClr val="24292E"/>
+                </a:solidFill>
+                <a:effectLst/>
+                <a:latin typeface="-apple-system"/>
+              </a:rPr>
+              <a:t>We want to create Rank formula through four steps:</a:t>
+            </a:r>
+          </a:p>
+          <a:p>
+            <a:pPr marL="514350" indent="-514350" algn="l">
+              <a:buFont typeface="+mj-lt"/>
+              <a:buAutoNum type="arabicPeriod"/>
+            </a:pPr>
+            <a:r>
+              <a:rPr lang="en-US" altLang="zh-CN" b="0" i="0">
+                <a:solidFill>
+                  <a:srgbClr val="24292E"/>
+                </a:solidFill>
+                <a:effectLst/>
+                <a:latin typeface="-apple-system"/>
+              </a:rPr>
+              <a:t>rating of the apps is of the most significant</a:t>
+            </a:r>
+            <a:r>
+              <a:rPr lang="en-US" altLang="zh-CN">
+                <a:solidFill>
+                  <a:srgbClr val="24292E"/>
+                </a:solidFill>
+                <a:latin typeface="-apple-system"/>
+              </a:rPr>
+              <a:t>, </a:t>
+            </a:r>
+            <a:r>
+              <a:rPr lang="en-US" altLang="zh-CN" b="0" i="0">
+                <a:solidFill>
+                  <a:srgbClr val="24292E"/>
+                </a:solidFill>
+                <a:effectLst/>
+                <a:latin typeface="-apple-system"/>
+              </a:rPr>
+              <a:t>and the downloads and the number of comments are also important to rank the apps, </a:t>
+            </a:r>
+          </a:p>
+          <a:p>
+            <a:pPr marL="514350" indent="-514350" algn="l">
+              <a:buFont typeface="+mj-lt"/>
+              <a:buAutoNum type="arabicPeriod"/>
+            </a:pPr>
+            <a:r>
+              <a:rPr lang="en-US" altLang="zh-CN" b="0" i="0">
+                <a:solidFill>
+                  <a:srgbClr val="24292E"/>
+                </a:solidFill>
+                <a:effectLst/>
+                <a:latin typeface="-apple-system"/>
+              </a:rPr>
+              <a:t>We use the rating and the number of installs to measure the measure the quality of Apps. </a:t>
+            </a:r>
+          </a:p>
+          <a:p>
+            <a:pPr marL="514350" indent="-514350" algn="l">
+              <a:buFont typeface="+mj-lt"/>
+              <a:buAutoNum type="arabicPeriod"/>
+            </a:pPr>
+            <a:r>
+              <a:rPr lang="en-US" altLang="zh-CN" b="0" i="0">
+                <a:solidFill>
+                  <a:srgbClr val="24292E"/>
+                </a:solidFill>
+                <a:effectLst/>
+                <a:latin typeface="-apple-system"/>
+              </a:rPr>
+              <a:t>there are also some dimensions of the apps in the dataset we need to analysis whether we should add them to the Rank formula</a:t>
+            </a:r>
+          </a:p>
+          <a:p>
+            <a:pPr marL="514350" indent="-514350" algn="l">
+              <a:buFont typeface="+mj-lt"/>
+              <a:buAutoNum type="arabicPeriod"/>
+            </a:pPr>
+            <a:r>
+              <a:rPr lang="en-US" altLang="zh-CN" b="0" i="0">
+                <a:solidFill>
+                  <a:srgbClr val="24292E"/>
+                </a:solidFill>
+                <a:effectLst/>
+                <a:latin typeface="-apple-system"/>
+              </a:rPr>
+              <a:t>such as the Size of the Apps, the Price of the Apps. In order to design the formula to rank Apps we post 4 sub questions.</a:t>
+            </a:r>
+          </a:p>
+          <a:p>
+            <a:endParaRPr lang="en-US"/>
+          </a:p>
+        </p:txBody>
+      </p:sp>
+    </p:spTree>
+    <p:extLst>
+      <p:ext uri="{BB962C8B-B14F-4D97-AF65-F5344CB8AC3E}">
+        <p14:creationId xmlns:p14="http://schemas.microsoft.com/office/powerpoint/2010/main" val="970001553"/>
+      </p:ext>
+    </p:extLst>
+  </p:cSld>
+  <p:clrMapOvr>
+    <a:masterClrMapping/>
+  </p:clrMapOvr>
+</p:sld>
+</file>
+
+<file path=ppt/slides/slide6.xml><?xml version="1.0" encoding="utf-8"?>
+<p:sld xmlns:a="http://schemas.openxmlformats.org/drawingml/2006/main" xmlns:r="http://schemas.openxmlformats.org/officeDocument/2006/relationships" xmlns:p="http://schemas.openxmlformats.org/presentationml/2006/main">
+  <p:cSld>
+    <p:spTree>
+      <p:nvGrpSpPr>
+        <p:cNvPr id="1" name=""/>
+        <p:cNvGrpSpPr/>
+        <p:nvPr/>
+      </p:nvGrpSpPr>
+      <p:grpSpPr>
+        <a:xfrm>
+          <a:off x="0" y="0"/>
+          <a:ext cx="0" cy="0"/>
+          <a:chOff x="0" y="0"/>
+          <a:chExt cx="0" cy="0"/>
+        </a:xfrm>
+      </p:grpSpPr>
+      <p:sp>
+        <p:nvSpPr>
           <p:cNvPr id="2" name="标题 1">
             <a:extLst>
               <a:ext uri="{FF2B5EF4-FFF2-40B4-BE49-F238E27FC236}">
@@ -5401,7 +6044,7 @@
 </p:sld>
 </file>
 
-<file path=ppt/slides/slide6.xml><?xml version="1.0" encoding="utf-8"?>
+<file path=ppt/slides/slide7.xml><?xml version="1.0" encoding="utf-8"?>
 <p:sld xmlns:a="http://schemas.openxmlformats.org/drawingml/2006/main" xmlns:r="http://schemas.openxmlformats.org/officeDocument/2006/relationships" xmlns:p="http://schemas.openxmlformats.org/presentationml/2006/main">
   <p:cSld>
     <p:spTree>
@@ -5500,7 +6143,7 @@
 </p:sld>
 </file>
 
-<file path=ppt/slides/slide7.xml><?xml version="1.0" encoding="utf-8"?>
+<file path=ppt/slides/slide8.xml><?xml version="1.0" encoding="utf-8"?>
 <p:sld xmlns:a="http://schemas.openxmlformats.org/drawingml/2006/main" xmlns:r="http://schemas.openxmlformats.org/officeDocument/2006/relationships" xmlns:p="http://schemas.openxmlformats.org/presentationml/2006/main">
   <p:cSld>
     <p:spTree>
@@ -5634,7 +6277,7 @@
 </p:sld>
 </file>
 
-<file path=ppt/slides/slide8.xml><?xml version="1.0" encoding="utf-8"?>
+<file path=ppt/slides/slide9.xml><?xml version="1.0" encoding="utf-8"?>
 <p:sld xmlns:a="http://schemas.openxmlformats.org/drawingml/2006/main" xmlns:r="http://schemas.openxmlformats.org/officeDocument/2006/relationships" xmlns:p="http://schemas.openxmlformats.org/presentationml/2006/main">
   <p:cSld>
     <p:spTree>
@@ -5755,90 +6398,6 @@
     <p:extLst>
       <p:ext uri="{BB962C8B-B14F-4D97-AF65-F5344CB8AC3E}">
         <p14:creationId xmlns:p14="http://schemas.microsoft.com/office/powerpoint/2010/main" val="1906732022"/>
-      </p:ext>
-    </p:extLst>
-  </p:cSld>
-  <p:clrMapOvr>
-    <a:masterClrMapping/>
-  </p:clrMapOvr>
-</p:sld>
-</file>
-
-<file path=ppt/slides/slide9.xml><?xml version="1.0" encoding="utf-8"?>
-<p:sld xmlns:a="http://schemas.openxmlformats.org/drawingml/2006/main" xmlns:r="http://schemas.openxmlformats.org/officeDocument/2006/relationships" xmlns:p="http://schemas.openxmlformats.org/presentationml/2006/main">
-  <p:cSld>
-    <p:spTree>
-      <p:nvGrpSpPr>
-        <p:cNvPr id="1" name=""/>
-        <p:cNvGrpSpPr/>
-        <p:nvPr/>
-      </p:nvGrpSpPr>
-      <p:grpSpPr>
-        <a:xfrm>
-          <a:off x="0" y="0"/>
-          <a:ext cx="0" cy="0"/>
-          <a:chOff x="0" y="0"/>
-          <a:chExt cx="0" cy="0"/>
-        </a:xfrm>
-      </p:grpSpPr>
-      <p:sp>
-        <p:nvSpPr>
-          <p:cNvPr id="2" name="标题 1">
-            <a:extLst>
-              <a:ext uri="{FF2B5EF4-FFF2-40B4-BE49-F238E27FC236}">
-                <a16:creationId xmlns:a16="http://schemas.microsoft.com/office/drawing/2014/main" id="{44CBC5AD-E05F-4366-982F-83A4B2546AF3}"/>
-              </a:ext>
-            </a:extLst>
-          </p:cNvPr>
-          <p:cNvSpPr>
-            <a:spLocks noGrp="1"/>
-          </p:cNvSpPr>
-          <p:nvPr>
-            <p:ph type="title"/>
-          </p:nvPr>
-        </p:nvSpPr>
-        <p:spPr/>
-        <p:txBody>
-          <a:bodyPr/>
-          <a:lstStyle/>
-          <a:p>
-            <a:r>
-              <a:rPr lang="en-US" altLang="zh-CN"/>
-              <a:t>price will affect user experience</a:t>
-            </a:r>
-            <a:endParaRPr lang="zh-CN" altLang="en-US"/>
-          </a:p>
-        </p:txBody>
-      </p:sp>
-      <p:sp>
-        <p:nvSpPr>
-          <p:cNvPr id="3" name="内容占位符 2">
-            <a:extLst>
-              <a:ext uri="{FF2B5EF4-FFF2-40B4-BE49-F238E27FC236}">
-                <a16:creationId xmlns:a16="http://schemas.microsoft.com/office/drawing/2014/main" id="{4CD4F0C0-EE9D-47BD-816A-0A4103DA6ED4}"/>
-              </a:ext>
-            </a:extLst>
-          </p:cNvPr>
-          <p:cNvSpPr>
-            <a:spLocks noGrp="1"/>
-          </p:cNvSpPr>
-          <p:nvPr>
-            <p:ph idx="1"/>
-          </p:nvPr>
-        </p:nvSpPr>
-        <p:spPr/>
-        <p:txBody>
-          <a:bodyPr/>
-          <a:lstStyle/>
-          <a:p>
-            <a:endParaRPr lang="zh-CN" altLang="en-US"/>
-          </a:p>
-        </p:txBody>
-      </p:sp>
-    </p:spTree>
-    <p:extLst>
-      <p:ext uri="{BB962C8B-B14F-4D97-AF65-F5344CB8AC3E}">
-        <p14:creationId xmlns:p14="http://schemas.microsoft.com/office/powerpoint/2010/main" val="1221480575"/>
       </p:ext>
     </p:extLst>
   </p:cSld>

</xml_diff>